<commit_message>
Changed Table and Optics
</commit_message>
<xml_diff>
--- a/src/assets/Tabelle.pptx
+++ b/src/assets/Tabelle.pptx
@@ -104,6 +104,11 @@
       </a:defRPr>
     </a:lvl9pPr>
   </p:defaultTextStyle>
+  <p:extLst>
+    <p:ext uri="{EFAFB233-063F-42B5-8137-9DF3F51BA10A}">
+      <p15:sldGuideLst xmlns:p15="http://schemas.microsoft.com/office/powerpoint/2012/main"/>
+    </p:ext>
+  </p:extLst>
 </p:presentation>
 </file>
 
@@ -254,7 +259,7 @@
           <a:p>
             <a:fld id="{23389740-3624-4DA2-A6FA-CD81A130F2DE}" type="datetimeFigureOut">
               <a:rPr lang="de-DE" smtClean="0"/>
-              <a:t>28.01.2022</a:t>
+              <a:t>01.02.2022</a:t>
             </a:fld>
             <a:endParaRPr lang="de-DE"/>
           </a:p>
@@ -452,7 +457,7 @@
           <a:p>
             <a:fld id="{23389740-3624-4DA2-A6FA-CD81A130F2DE}" type="datetimeFigureOut">
               <a:rPr lang="de-DE" smtClean="0"/>
-              <a:t>28.01.2022</a:t>
+              <a:t>01.02.2022</a:t>
             </a:fld>
             <a:endParaRPr lang="de-DE"/>
           </a:p>
@@ -660,7 +665,7 @@
           <a:p>
             <a:fld id="{23389740-3624-4DA2-A6FA-CD81A130F2DE}" type="datetimeFigureOut">
               <a:rPr lang="de-DE" smtClean="0"/>
-              <a:t>28.01.2022</a:t>
+              <a:t>01.02.2022</a:t>
             </a:fld>
             <a:endParaRPr lang="de-DE"/>
           </a:p>
@@ -858,7 +863,7 @@
           <a:p>
             <a:fld id="{23389740-3624-4DA2-A6FA-CD81A130F2DE}" type="datetimeFigureOut">
               <a:rPr lang="de-DE" smtClean="0"/>
-              <a:t>28.01.2022</a:t>
+              <a:t>01.02.2022</a:t>
             </a:fld>
             <a:endParaRPr lang="de-DE"/>
           </a:p>
@@ -1133,7 +1138,7 @@
           <a:p>
             <a:fld id="{23389740-3624-4DA2-A6FA-CD81A130F2DE}" type="datetimeFigureOut">
               <a:rPr lang="de-DE" smtClean="0"/>
-              <a:t>28.01.2022</a:t>
+              <a:t>01.02.2022</a:t>
             </a:fld>
             <a:endParaRPr lang="de-DE"/>
           </a:p>
@@ -1398,7 +1403,7 @@
           <a:p>
             <a:fld id="{23389740-3624-4DA2-A6FA-CD81A130F2DE}" type="datetimeFigureOut">
               <a:rPr lang="de-DE" smtClean="0"/>
-              <a:t>28.01.2022</a:t>
+              <a:t>01.02.2022</a:t>
             </a:fld>
             <a:endParaRPr lang="de-DE"/>
           </a:p>
@@ -1810,7 +1815,7 @@
           <a:p>
             <a:fld id="{23389740-3624-4DA2-A6FA-CD81A130F2DE}" type="datetimeFigureOut">
               <a:rPr lang="de-DE" smtClean="0"/>
-              <a:t>28.01.2022</a:t>
+              <a:t>01.02.2022</a:t>
             </a:fld>
             <a:endParaRPr lang="de-DE"/>
           </a:p>
@@ -1951,7 +1956,7 @@
           <a:p>
             <a:fld id="{23389740-3624-4DA2-A6FA-CD81A130F2DE}" type="datetimeFigureOut">
               <a:rPr lang="de-DE" smtClean="0"/>
-              <a:t>28.01.2022</a:t>
+              <a:t>01.02.2022</a:t>
             </a:fld>
             <a:endParaRPr lang="de-DE"/>
           </a:p>
@@ -2064,7 +2069,7 @@
           <a:p>
             <a:fld id="{23389740-3624-4DA2-A6FA-CD81A130F2DE}" type="datetimeFigureOut">
               <a:rPr lang="de-DE" smtClean="0"/>
-              <a:t>28.01.2022</a:t>
+              <a:t>01.02.2022</a:t>
             </a:fld>
             <a:endParaRPr lang="de-DE"/>
           </a:p>
@@ -2375,7 +2380,7 @@
           <a:p>
             <a:fld id="{23389740-3624-4DA2-A6FA-CD81A130F2DE}" type="datetimeFigureOut">
               <a:rPr lang="de-DE" smtClean="0"/>
-              <a:t>28.01.2022</a:t>
+              <a:t>01.02.2022</a:t>
             </a:fld>
             <a:endParaRPr lang="de-DE"/>
           </a:p>
@@ -2663,7 +2668,7 @@
           <a:p>
             <a:fld id="{23389740-3624-4DA2-A6FA-CD81A130F2DE}" type="datetimeFigureOut">
               <a:rPr lang="de-DE" smtClean="0"/>
-              <a:t>28.01.2022</a:t>
+              <a:t>01.02.2022</a:t>
             </a:fld>
             <a:endParaRPr lang="de-DE"/>
           </a:p>
@@ -2904,7 +2909,7 @@
           <a:p>
             <a:fld id="{23389740-3624-4DA2-A6FA-CD81A130F2DE}" type="datetimeFigureOut">
               <a:rPr lang="de-DE" smtClean="0"/>
-              <a:t>28.01.2022</a:t>
+              <a:t>01.02.2022</a:t>
             </a:fld>
             <a:endParaRPr lang="de-DE"/>
           </a:p>
@@ -3336,7 +3341,7 @@
           <p:nvPr>
             <p:extLst>
               <p:ext uri="{D42A27DB-BD31-4B8C-83A1-F6EECF244321}">
-                <p14:modId xmlns:p14="http://schemas.microsoft.com/office/powerpoint/2010/main" val="3064863542"/>
+                <p14:modId xmlns:p14="http://schemas.microsoft.com/office/powerpoint/2010/main" val="3431105813"/>
               </p:ext>
             </p:extLst>
           </p:nvPr>
@@ -3450,70 +3455,6 @@
                       <a:pPr algn="ctr"/>
                       <a:r>
                         <a:rPr lang="de-DE" sz="1600" dirty="0"/>
-                        <a:t>Sauer</a:t>
-                      </a:r>
-                      <a:endParaRPr lang="de-DE" sz="1600" dirty="0">
-                        <a:latin typeface="Arial Rounded MT Bold" panose="020F0704030504030204" pitchFamily="34" charset="0"/>
-                      </a:endParaRPr>
-                    </a:p>
-                  </a:txBody>
-                  <a:tcPr/>
-                </a:tc>
-                <a:tc>
-                  <a:txBody>
-                    <a:bodyPr/>
-                    <a:lstStyle/>
-                    <a:p>
-                      <a:pPr algn="ctr"/>
-                      <a:r>
-                        <a:rPr lang="de-DE" dirty="0"/>
-                        <a:t>✅</a:t>
-                      </a:r>
-                    </a:p>
-                  </a:txBody>
-                  <a:tcPr/>
-                </a:tc>
-                <a:tc>
-                  <a:txBody>
-                    <a:bodyPr/>
-                    <a:lstStyle/>
-                    <a:p>
-                      <a:pPr algn="ctr"/>
-                      <a:r>
-                        <a:rPr lang="de-DE" sz="1400" dirty="0"/>
-                        <a:t>Montag 31.1 13:30</a:t>
-                      </a:r>
-                      <a:endParaRPr lang="de-DE" dirty="0"/>
-                    </a:p>
-                  </a:txBody>
-                  <a:tcPr/>
-                </a:tc>
-                <a:tc>
-                  <a:txBody>
-                    <a:bodyPr/>
-                    <a:lstStyle/>
-                    <a:p>
-                      <a:pPr algn="ctr"/>
-                      <a:endParaRPr lang="de-DE" dirty="0"/>
-                    </a:p>
-                  </a:txBody>
-                  <a:tcPr/>
-                </a:tc>
-                <a:extLst>
-                  <a:ext uri="{0D108BD9-81ED-4DB2-BD59-A6C34878D82A}">
-                    <a16:rowId xmlns:a16="http://schemas.microsoft.com/office/drawing/2014/main" val="2428798627"/>
-                  </a:ext>
-                </a:extLst>
-              </a:tr>
-              <a:tr h="370840">
-                <a:tc>
-                  <a:txBody>
-                    <a:bodyPr/>
-                    <a:lstStyle/>
-                    <a:p>
-                      <a:pPr algn="ctr"/>
-                      <a:r>
-                        <a:rPr lang="de-DE" sz="1600" dirty="0"/>
                         <a:t>Fischer</a:t>
                       </a:r>
                       <a:endParaRPr lang="de-DE" sz="1600" dirty="0">
@@ -3561,7 +3502,7 @@
                       <a:pPr algn="ctr"/>
                       <a:r>
                         <a:rPr lang="de-DE" sz="1400" dirty="0"/>
-                        <a:t>Montag 31.1 14:45</a:t>
+                        <a:t>Freitag 4.2 11:30</a:t>
                       </a:r>
                       <a:endParaRPr lang="de-DE" dirty="0"/>
                     </a:p>
@@ -3652,8 +3593,27 @@
                     <a:bodyPr/>
                     <a:lstStyle/>
                     <a:p>
-                      <a:pPr algn="ctr"/>
-                      <a:endParaRPr lang="de-DE"/>
+                      <a:pPr marL="0" marR="0" lvl="0" indent="0" algn="ctr" defTabSz="914400" rtl="0" eaLnBrk="1" fontAlgn="auto" latinLnBrk="0" hangingPunct="1">
+                        <a:lnSpc>
+                          <a:spcPct val="100000"/>
+                        </a:lnSpc>
+                        <a:spcBef>
+                          <a:spcPts val="0"/>
+                        </a:spcBef>
+                        <a:spcAft>
+                          <a:spcPts val="0"/>
+                        </a:spcAft>
+                        <a:buClrTx/>
+                        <a:buSzTx/>
+                        <a:buFontTx/>
+                        <a:buNone/>
+                        <a:tabLst/>
+                        <a:defRPr/>
+                      </a:pPr>
+                      <a:r>
+                        <a:rPr lang="de-DE" dirty="0"/>
+                        <a:t>✅</a:t>
+                      </a:r>
                     </a:p>
                   </a:txBody>
                   <a:tcPr/>
@@ -3704,7 +3664,7 @@
                       <a:pPr algn="ctr"/>
                       <a:r>
                         <a:rPr lang="de-DE" sz="1400" dirty="0"/>
-                        <a:t>Dienstag 1.2 14:00</a:t>
+                        <a:t>Donnerstag 3.2 14:00</a:t>
                       </a:r>
                     </a:p>
                   </a:txBody>
@@ -3767,7 +3727,7 @@
                       <a:pPr algn="ctr"/>
                       <a:r>
                         <a:rPr lang="de-DE" sz="1400" dirty="0"/>
-                        <a:t>Mittwoch 2.2 13:30</a:t>
+                        <a:t>Mittwoch 2.2 14:30</a:t>
                       </a:r>
                     </a:p>
                   </a:txBody>
@@ -3830,7 +3790,7 @@
                       <a:pPr algn="ctr"/>
                       <a:r>
                         <a:rPr lang="de-DE" sz="1400" dirty="0"/>
-                        <a:t>Mittwoch 2.2 14:30</a:t>
+                        <a:t>Mittwoch 9.2 14:30</a:t>
                       </a:r>
                     </a:p>
                   </a:txBody>
@@ -3953,8 +3913,27 @@
                     <a:bodyPr/>
                     <a:lstStyle/>
                     <a:p>
-                      <a:pPr algn="ctr"/>
-                      <a:endParaRPr lang="de-DE" sz="1400" dirty="0"/>
+                      <a:pPr marL="0" marR="0" lvl="0" indent="0" algn="ctr" defTabSz="914400" rtl="0" eaLnBrk="1" fontAlgn="auto" latinLnBrk="0" hangingPunct="1">
+                        <a:lnSpc>
+                          <a:spcPct val="100000"/>
+                        </a:lnSpc>
+                        <a:spcBef>
+                          <a:spcPts val="0"/>
+                        </a:spcBef>
+                        <a:spcAft>
+                          <a:spcPts val="0"/>
+                        </a:spcAft>
+                        <a:buClrTx/>
+                        <a:buSzTx/>
+                        <a:buFontTx/>
+                        <a:buNone/>
+                        <a:tabLst/>
+                        <a:defRPr/>
+                      </a:pPr>
+                      <a:r>
+                        <a:rPr lang="de-DE" sz="1400" dirty="0"/>
+                        <a:t>Mittwoch 2.2 13:15</a:t>
+                      </a:r>
                     </a:p>
                   </a:txBody>
                   <a:tcPr/>
@@ -3973,6 +3952,86 @@
                 <a:extLst>
                   <a:ext uri="{0D108BD9-81ED-4DB2-BD59-A6C34878D82A}">
                     <a16:rowId xmlns:a16="http://schemas.microsoft.com/office/drawing/2014/main" val="2992503000"/>
+                  </a:ext>
+                </a:extLst>
+              </a:tr>
+              <a:tr h="370840">
+                <a:tc>
+                  <a:txBody>
+                    <a:bodyPr/>
+                    <a:lstStyle/>
+                    <a:p>
+                      <a:pPr algn="ctr"/>
+                      <a:r>
+                        <a:rPr lang="de-DE" sz="1600" kern="1200" dirty="0">
+                          <a:solidFill>
+                            <a:schemeClr val="dk1"/>
+                          </a:solidFill>
+                          <a:latin typeface="+mn-lt"/>
+                          <a:ea typeface="+mn-ea"/>
+                          <a:cs typeface="+mn-cs"/>
+                        </a:rPr>
+                        <a:t>Latteyer</a:t>
+                      </a:r>
+                    </a:p>
+                  </a:txBody>
+                  <a:tcPr/>
+                </a:tc>
+                <a:tc>
+                  <a:txBody>
+                    <a:bodyPr/>
+                    <a:lstStyle/>
+                    <a:p>
+                      <a:pPr marL="0" marR="0" lvl="0" indent="0" algn="ctr" defTabSz="914400" rtl="0" eaLnBrk="1" fontAlgn="auto" latinLnBrk="0" hangingPunct="1">
+                        <a:lnSpc>
+                          <a:spcPct val="100000"/>
+                        </a:lnSpc>
+                        <a:spcBef>
+                          <a:spcPts val="0"/>
+                        </a:spcBef>
+                        <a:spcAft>
+                          <a:spcPts val="0"/>
+                        </a:spcAft>
+                        <a:buClrTx/>
+                        <a:buSzTx/>
+                        <a:buFontTx/>
+                        <a:buNone/>
+                        <a:tabLst/>
+                        <a:defRPr/>
+                      </a:pPr>
+                      <a:r>
+                        <a:rPr lang="de-DE" dirty="0"/>
+                        <a:t>✅</a:t>
+                      </a:r>
+                    </a:p>
+                  </a:txBody>
+                  <a:tcPr/>
+                </a:tc>
+                <a:tc>
+                  <a:txBody>
+                    <a:bodyPr/>
+                    <a:lstStyle/>
+                    <a:p>
+                      <a:pPr algn="ctr"/>
+                      <a:endParaRPr lang="de-DE" sz="1400"/>
+                    </a:p>
+                  </a:txBody>
+                  <a:tcPr/>
+                </a:tc>
+                <a:tc>
+                  <a:txBody>
+                    <a:bodyPr/>
+                    <a:lstStyle/>
+                    <a:p>
+                      <a:pPr algn="ctr"/>
+                      <a:endParaRPr lang="de-DE" dirty="0"/>
+                    </a:p>
+                  </a:txBody>
+                  <a:tcPr/>
+                </a:tc>
+                <a:extLst>
+                  <a:ext uri="{0D108BD9-81ED-4DB2-BD59-A6C34878D82A}">
+                    <a16:rowId xmlns:a16="http://schemas.microsoft.com/office/drawing/2014/main" val="819345551"/>
                   </a:ext>
                 </a:extLst>
               </a:tr>

</xml_diff>